<commit_message>
updated image for qs all.
</commit_message>
<xml_diff>
--- a/presentations/Images/second_präsentation_qsa_grafik.pptx
+++ b/presentations/Images/second_präsentation_qsa_grafik.pptx
@@ -307,7 +307,7 @@
           <a:p>
             <a:fld id="{9BB72546-5250-EB4D-8A80-4FEF2C469132}" type="datetimeFigureOut">
               <a:rPr lang="en-US" smtClean="0"/>
-              <a:t>2/8/22</a:t>
+              <a:t>2/11/22</a:t>
             </a:fld>
             <a:endParaRPr lang="en-US"/>
           </a:p>
@@ -507,7 +507,7 @@
           <a:p>
             <a:fld id="{9BB72546-5250-EB4D-8A80-4FEF2C469132}" type="datetimeFigureOut">
               <a:rPr lang="en-US" smtClean="0"/>
-              <a:t>2/8/22</a:t>
+              <a:t>2/11/22</a:t>
             </a:fld>
             <a:endParaRPr lang="en-US"/>
           </a:p>
@@ -717,7 +717,7 @@
           <a:p>
             <a:fld id="{9BB72546-5250-EB4D-8A80-4FEF2C469132}" type="datetimeFigureOut">
               <a:rPr lang="en-US" smtClean="0"/>
-              <a:t>2/8/22</a:t>
+              <a:t>2/11/22</a:t>
             </a:fld>
             <a:endParaRPr lang="en-US"/>
           </a:p>
@@ -917,7 +917,7 @@
           <a:p>
             <a:fld id="{9BB72546-5250-EB4D-8A80-4FEF2C469132}" type="datetimeFigureOut">
               <a:rPr lang="en-US" smtClean="0"/>
-              <a:t>2/8/22</a:t>
+              <a:t>2/11/22</a:t>
             </a:fld>
             <a:endParaRPr lang="en-US"/>
           </a:p>
@@ -1193,7 +1193,7 @@
           <a:p>
             <a:fld id="{9BB72546-5250-EB4D-8A80-4FEF2C469132}" type="datetimeFigureOut">
               <a:rPr lang="en-US" smtClean="0"/>
-              <a:t>2/8/22</a:t>
+              <a:t>2/11/22</a:t>
             </a:fld>
             <a:endParaRPr lang="en-US"/>
           </a:p>
@@ -1461,7 +1461,7 @@
           <a:p>
             <a:fld id="{9BB72546-5250-EB4D-8A80-4FEF2C469132}" type="datetimeFigureOut">
               <a:rPr lang="en-US" smtClean="0"/>
-              <a:t>2/8/22</a:t>
+              <a:t>2/11/22</a:t>
             </a:fld>
             <a:endParaRPr lang="en-US"/>
           </a:p>
@@ -1876,7 +1876,7 @@
           <a:p>
             <a:fld id="{9BB72546-5250-EB4D-8A80-4FEF2C469132}" type="datetimeFigureOut">
               <a:rPr lang="en-US" smtClean="0"/>
-              <a:t>2/8/22</a:t>
+              <a:t>2/11/22</a:t>
             </a:fld>
             <a:endParaRPr lang="en-US"/>
           </a:p>
@@ -2018,7 +2018,7 @@
           <a:p>
             <a:fld id="{9BB72546-5250-EB4D-8A80-4FEF2C469132}" type="datetimeFigureOut">
               <a:rPr lang="en-US" smtClean="0"/>
-              <a:t>2/8/22</a:t>
+              <a:t>2/11/22</a:t>
             </a:fld>
             <a:endParaRPr lang="en-US"/>
           </a:p>
@@ -2131,7 +2131,7 @@
           <a:p>
             <a:fld id="{9BB72546-5250-EB4D-8A80-4FEF2C469132}" type="datetimeFigureOut">
               <a:rPr lang="en-US" smtClean="0"/>
-              <a:t>2/8/22</a:t>
+              <a:t>2/11/22</a:t>
             </a:fld>
             <a:endParaRPr lang="en-US"/>
           </a:p>
@@ -2444,7 +2444,7 @@
           <a:p>
             <a:fld id="{9BB72546-5250-EB4D-8A80-4FEF2C469132}" type="datetimeFigureOut">
               <a:rPr lang="en-US" smtClean="0"/>
-              <a:t>2/8/22</a:t>
+              <a:t>2/11/22</a:t>
             </a:fld>
             <a:endParaRPr lang="en-US"/>
           </a:p>
@@ -2733,7 +2733,7 @@
           <a:p>
             <a:fld id="{9BB72546-5250-EB4D-8A80-4FEF2C469132}" type="datetimeFigureOut">
               <a:rPr lang="en-US" smtClean="0"/>
-              <a:t>2/8/22</a:t>
+              <a:t>2/11/22</a:t>
             </a:fld>
             <a:endParaRPr lang="en-US"/>
           </a:p>
@@ -2976,7 +2976,7 @@
           <a:p>
             <a:fld id="{9BB72546-5250-EB4D-8A80-4FEF2C469132}" type="datetimeFigureOut">
               <a:rPr lang="en-US" smtClean="0"/>
-              <a:t>2/8/22</a:t>
+              <a:t>2/11/22</a:t>
             </a:fld>
             <a:endParaRPr lang="en-US"/>
           </a:p>
@@ -5475,6 +5475,143 @@
           </p:pic>
         </p:grpSp>
       </p:grpSp>
+      <mc:AlternateContent xmlns:mc="http://schemas.openxmlformats.org/markup-compatibility/2006" xmlns:a14="http://schemas.microsoft.com/office/drawing/2010/main">
+        <mc:Choice Requires="a14">
+          <p:sp>
+            <p:nvSpPr>
+              <p:cNvPr id="31" name="Textfeld 30">
+                <a:extLst>
+                  <a:ext uri="{FF2B5EF4-FFF2-40B4-BE49-F238E27FC236}">
+                    <a16:creationId xmlns:a16="http://schemas.microsoft.com/office/drawing/2014/main" id="{CF618843-AD73-5546-9D45-52DA2BD63E0C}"/>
+                  </a:ext>
+                </a:extLst>
+              </p:cNvPr>
+              <p:cNvSpPr txBox="1"/>
+              <p:nvPr/>
+            </p:nvSpPr>
+            <p:spPr>
+              <a:xfrm>
+                <a:off x="7314123" y="3610844"/>
+                <a:ext cx="428168" cy="307777"/>
+              </a:xfrm>
+              <a:prstGeom prst="rect">
+                <a:avLst/>
+              </a:prstGeom>
+              <a:noFill/>
+            </p:spPr>
+            <p:txBody>
+              <a:bodyPr wrap="square" rtlCol="0">
+                <a:spAutoFit/>
+              </a:bodyPr>
+              <a:lstStyle/>
+              <a:p>
+                <a:pPr algn="ctr"/>
+                <a14:m>
+                  <m:oMathPara xmlns:m="http://schemas.openxmlformats.org/officeDocument/2006/math">
+                    <m:oMathParaPr>
+                      <m:jc m:val="center"/>
+                    </m:oMathParaPr>
+                    <m:oMath xmlns:m="http://schemas.openxmlformats.org/officeDocument/2006/math">
+                      <m:sSub>
+                        <m:sSubPr>
+                          <m:ctrlPr>
+                            <a:rPr lang="de-DE" sz="1400" b="0" i="1" smtClean="0">
+                              <a:solidFill>
+                                <a:srgbClr val="8E8D8A"/>
+                              </a:solidFill>
+                              <a:latin typeface="Cambria Math" panose="02040503050406030204" pitchFamily="18" charset="0"/>
+                              <a:ea typeface="Noto Sans Adlam" panose="020B0502040504020204" pitchFamily="34" charset="0"/>
+                              <a:cs typeface="Noto Sans Adlam" panose="020B0502040504020204" pitchFamily="34" charset="0"/>
+                            </a:rPr>
+                          </m:ctrlPr>
+                        </m:sSubPr>
+                        <m:e>
+                          <m:r>
+                            <a:rPr lang="de-DE" sz="1400" b="0" i="1" smtClean="0">
+                              <a:solidFill>
+                                <a:srgbClr val="8E8D8A"/>
+                              </a:solidFill>
+                              <a:latin typeface="Cambria Math" panose="02040503050406030204" pitchFamily="18" charset="0"/>
+                              <a:ea typeface="Noto Sans Adlam" panose="020B0502040504020204" pitchFamily="34" charset="0"/>
+                              <a:cs typeface="Noto Sans Adlam" panose="020B0502040504020204" pitchFamily="34" charset="0"/>
+                            </a:rPr>
+                            <m:t>𝑞</m:t>
+                          </m:r>
+                        </m:e>
+                        <m:sub>
+                          <m:r>
+                            <a:rPr lang="de-DE" sz="1400" b="0" i="1" smtClean="0">
+                              <a:solidFill>
+                                <a:srgbClr val="8E8D8A"/>
+                              </a:solidFill>
+                              <a:latin typeface="Cambria Math" panose="02040503050406030204" pitchFamily="18" charset="0"/>
+                              <a:ea typeface="Noto Sans Adlam" panose="020B0502040504020204" pitchFamily="34" charset="0"/>
+                              <a:cs typeface="Noto Sans Adlam" panose="020B0502040504020204" pitchFamily="34" charset="0"/>
+                            </a:rPr>
+                            <m:t>0.6</m:t>
+                          </m:r>
+                        </m:sub>
+                      </m:sSub>
+                    </m:oMath>
+                  </m:oMathPara>
+                </a14:m>
+                <a:endParaRPr lang="en-US" sz="1400" dirty="0">
+                  <a:solidFill>
+                    <a:srgbClr val="8E8D8A"/>
+                  </a:solidFill>
+                  <a:latin typeface="Noto Sans Adlam" panose="020B0502040504020204" pitchFamily="34" charset="0"/>
+                  <a:ea typeface="Noto Sans Adlam" panose="020B0502040504020204" pitchFamily="34" charset="0"/>
+                  <a:cs typeface="Noto Sans Adlam" panose="020B0502040504020204" pitchFamily="34" charset="0"/>
+                </a:endParaRPr>
+              </a:p>
+            </p:txBody>
+          </p:sp>
+        </mc:Choice>
+        <mc:Fallback xmlns="">
+          <p:sp>
+            <p:nvSpPr>
+              <p:cNvPr id="31" name="Textfeld 30">
+                <a:extLst>
+                  <a:ext uri="{FF2B5EF4-FFF2-40B4-BE49-F238E27FC236}">
+                    <a16:creationId xmlns:a16="http://schemas.microsoft.com/office/drawing/2014/main" id="{CF618843-AD73-5546-9D45-52DA2BD63E0C}"/>
+                  </a:ext>
+                </a:extLst>
+              </p:cNvPr>
+              <p:cNvSpPr txBox="1">
+                <a:spLocks noRot="1" noChangeAspect="1" noMove="1" noResize="1" noEditPoints="1" noAdjustHandles="1" noChangeArrowheads="1" noChangeShapeType="1" noTextEdit="1"/>
+              </p:cNvSpPr>
+              <p:nvPr/>
+            </p:nvSpPr>
+            <p:spPr>
+              <a:xfrm>
+                <a:off x="7314123" y="3610844"/>
+                <a:ext cx="428168" cy="307777"/>
+              </a:xfrm>
+              <a:prstGeom prst="rect">
+                <a:avLst/>
+              </a:prstGeom>
+              <a:blipFill>
+                <a:blip r:embed="rId11"/>
+                <a:stretch>
+                  <a:fillRect l="-2941" b="-8000"/>
+                </a:stretch>
+              </a:blipFill>
+            </p:spPr>
+            <p:txBody>
+              <a:bodyPr/>
+              <a:lstStyle/>
+              <a:p>
+                <a:r>
+                  <a:rPr lang="en-US">
+                    <a:noFill/>
+                  </a:rPr>
+                  <a:t> </a:t>
+                </a:r>
+              </a:p>
+            </p:txBody>
+          </p:sp>
+        </mc:Fallback>
+      </mc:AlternateContent>
     </p:spTree>
     <p:extLst>
       <p:ext uri="{BB962C8B-B14F-4D97-AF65-F5344CB8AC3E}">
@@ -14107,6 +14244,143 @@
           </p:pic>
         </p:grpSp>
       </p:grpSp>
+      <mc:AlternateContent xmlns:mc="http://schemas.openxmlformats.org/markup-compatibility/2006">
+        <mc:Choice xmlns:a14="http://schemas.microsoft.com/office/drawing/2010/main" Requires="a14">
+          <p:sp>
+            <p:nvSpPr>
+              <p:cNvPr id="80" name="Textfeld 79">
+                <a:extLst>
+                  <a:ext uri="{FF2B5EF4-FFF2-40B4-BE49-F238E27FC236}">
+                    <a16:creationId xmlns:a16="http://schemas.microsoft.com/office/drawing/2014/main" id="{FF7824A2-D4DF-C34C-8E14-A5C81E6DB896}"/>
+                  </a:ext>
+                </a:extLst>
+              </p:cNvPr>
+              <p:cNvSpPr txBox="1"/>
+              <p:nvPr/>
+            </p:nvSpPr>
+            <p:spPr>
+              <a:xfrm>
+                <a:off x="7326428" y="930880"/>
+                <a:ext cx="428168" cy="307777"/>
+              </a:xfrm>
+              <a:prstGeom prst="rect">
+                <a:avLst/>
+              </a:prstGeom>
+              <a:noFill/>
+            </p:spPr>
+            <p:txBody>
+              <a:bodyPr wrap="square" rtlCol="0">
+                <a:spAutoFit/>
+              </a:bodyPr>
+              <a:lstStyle/>
+              <a:p>
+                <a:pPr algn="ctr"/>
+                <a14:m>
+                  <m:oMathPara xmlns:m="http://schemas.openxmlformats.org/officeDocument/2006/math">
+                    <m:oMathParaPr>
+                      <m:jc m:val="center"/>
+                    </m:oMathParaPr>
+                    <m:oMath xmlns:m="http://schemas.openxmlformats.org/officeDocument/2006/math">
+                      <m:sSub>
+                        <m:sSubPr>
+                          <m:ctrlPr>
+                            <a:rPr lang="de-DE" sz="1400" b="0" i="1" smtClean="0">
+                              <a:solidFill>
+                                <a:srgbClr val="8E8D8A"/>
+                              </a:solidFill>
+                              <a:latin typeface="Cambria Math" panose="02040503050406030204" pitchFamily="18" charset="0"/>
+                              <a:ea typeface="Noto Sans Adlam" panose="020B0502040504020204" pitchFamily="34" charset="0"/>
+                              <a:cs typeface="Noto Sans Adlam" panose="020B0502040504020204" pitchFamily="34" charset="0"/>
+                            </a:rPr>
+                          </m:ctrlPr>
+                        </m:sSubPr>
+                        <m:e>
+                          <m:r>
+                            <a:rPr lang="de-DE" sz="1400" b="0" i="1" smtClean="0">
+                              <a:solidFill>
+                                <a:srgbClr val="8E8D8A"/>
+                              </a:solidFill>
+                              <a:latin typeface="Cambria Math" panose="02040503050406030204" pitchFamily="18" charset="0"/>
+                              <a:ea typeface="Noto Sans Adlam" panose="020B0502040504020204" pitchFamily="34" charset="0"/>
+                              <a:cs typeface="Noto Sans Adlam" panose="020B0502040504020204" pitchFamily="34" charset="0"/>
+                            </a:rPr>
+                            <m:t>𝑞</m:t>
+                          </m:r>
+                        </m:e>
+                        <m:sub>
+                          <m:r>
+                            <a:rPr lang="de-DE" sz="1400" b="0" i="1" smtClean="0">
+                              <a:solidFill>
+                                <a:srgbClr val="8E8D8A"/>
+                              </a:solidFill>
+                              <a:latin typeface="Cambria Math" panose="02040503050406030204" pitchFamily="18" charset="0"/>
+                              <a:ea typeface="Noto Sans Adlam" panose="020B0502040504020204" pitchFamily="34" charset="0"/>
+                              <a:cs typeface="Noto Sans Adlam" panose="020B0502040504020204" pitchFamily="34" charset="0"/>
+                            </a:rPr>
+                            <m:t>0.6</m:t>
+                          </m:r>
+                        </m:sub>
+                      </m:sSub>
+                    </m:oMath>
+                  </m:oMathPara>
+                </a14:m>
+                <a:endParaRPr lang="en-US" sz="1400" dirty="0">
+                  <a:solidFill>
+                    <a:srgbClr val="8E8D8A"/>
+                  </a:solidFill>
+                  <a:latin typeface="Noto Sans Adlam" panose="020B0502040504020204" pitchFamily="34" charset="0"/>
+                  <a:ea typeface="Noto Sans Adlam" panose="020B0502040504020204" pitchFamily="34" charset="0"/>
+                  <a:cs typeface="Noto Sans Adlam" panose="020B0502040504020204" pitchFamily="34" charset="0"/>
+                </a:endParaRPr>
+              </a:p>
+            </p:txBody>
+          </p:sp>
+        </mc:Choice>
+        <mc:Fallback>
+          <p:sp>
+            <p:nvSpPr>
+              <p:cNvPr id="80" name="Textfeld 79">
+                <a:extLst>
+                  <a:ext uri="{FF2B5EF4-FFF2-40B4-BE49-F238E27FC236}">
+                    <a16:creationId xmlns:a16="http://schemas.microsoft.com/office/drawing/2014/main" id="{FF7824A2-D4DF-C34C-8E14-A5C81E6DB896}"/>
+                  </a:ext>
+                </a:extLst>
+              </p:cNvPr>
+              <p:cNvSpPr txBox="1">
+                <a:spLocks noRot="1" noChangeAspect="1" noMove="1" noResize="1" noEditPoints="1" noAdjustHandles="1" noChangeArrowheads="1" noChangeShapeType="1" noTextEdit="1"/>
+              </p:cNvSpPr>
+              <p:nvPr/>
+            </p:nvSpPr>
+            <p:spPr>
+              <a:xfrm>
+                <a:off x="7326428" y="930880"/>
+                <a:ext cx="428168" cy="307777"/>
+              </a:xfrm>
+              <a:prstGeom prst="rect">
+                <a:avLst/>
+              </a:prstGeom>
+              <a:blipFill>
+                <a:blip r:embed="rId21"/>
+                <a:stretch>
+                  <a:fillRect b="-8000"/>
+                </a:stretch>
+              </a:blipFill>
+            </p:spPr>
+            <p:txBody>
+              <a:bodyPr/>
+              <a:lstStyle/>
+              <a:p>
+                <a:r>
+                  <a:rPr lang="en-US">
+                    <a:noFill/>
+                  </a:rPr>
+                  <a:t> </a:t>
+                </a:r>
+              </a:p>
+            </p:txBody>
+          </p:sp>
+        </mc:Fallback>
+      </mc:AlternateContent>
     </p:spTree>
     <p:extLst>
       <p:ext uri="{BB962C8B-B14F-4D97-AF65-F5344CB8AC3E}">

</xml_diff>